<commit_message>
Lecture 7 and samples
</commit_message>
<xml_diff>
--- a/06-Arrays.pptx
+++ b/06-Arrays.pptx
@@ -224,7 +224,7 @@
           <a:p>
             <a:fld id="{1A052DDE-B79B-4585-97B6-DCDE6083B029}" type="datetimeFigureOut">
               <a:rPr lang="bg-BG" smtClean="0"/>
-              <a:t>23.6.2015 г.</a:t>
+              <a:t>25.6.2015 г.</a:t>
             </a:fld>
             <a:endParaRPr lang="bg-BG"/>
           </a:p>
@@ -757,7 +757,7 @@
           <a:p>
             <a:fld id="{3EA744D9-3FBE-48D8-BF2A-85DF203E4D20}" type="datetimeFigureOut">
               <a:rPr lang="bg-BG" smtClean="0"/>
-              <a:t>23.6.2015 г.</a:t>
+              <a:t>25.6.2015 г.</a:t>
             </a:fld>
             <a:endParaRPr lang="bg-BG"/>
           </a:p>
@@ -927,7 +927,7 @@
           <a:p>
             <a:fld id="{3EA744D9-3FBE-48D8-BF2A-85DF203E4D20}" type="datetimeFigureOut">
               <a:rPr lang="bg-BG" smtClean="0"/>
-              <a:t>23.6.2015 г.</a:t>
+              <a:t>25.6.2015 г.</a:t>
             </a:fld>
             <a:endParaRPr lang="bg-BG"/>
           </a:p>
@@ -1107,7 +1107,7 @@
           <a:p>
             <a:fld id="{3EA744D9-3FBE-48D8-BF2A-85DF203E4D20}" type="datetimeFigureOut">
               <a:rPr lang="bg-BG" smtClean="0"/>
-              <a:t>23.6.2015 г.</a:t>
+              <a:t>25.6.2015 г.</a:t>
             </a:fld>
             <a:endParaRPr lang="bg-BG"/>
           </a:p>
@@ -1277,7 +1277,7 @@
           <a:p>
             <a:fld id="{3EA744D9-3FBE-48D8-BF2A-85DF203E4D20}" type="datetimeFigureOut">
               <a:rPr lang="bg-BG" smtClean="0"/>
-              <a:t>23.6.2015 г.</a:t>
+              <a:t>25.6.2015 г.</a:t>
             </a:fld>
             <a:endParaRPr lang="bg-BG"/>
           </a:p>
@@ -1523,7 +1523,7 @@
           <a:p>
             <a:fld id="{3EA744D9-3FBE-48D8-BF2A-85DF203E4D20}" type="datetimeFigureOut">
               <a:rPr lang="bg-BG" smtClean="0"/>
-              <a:t>23.6.2015 г.</a:t>
+              <a:t>25.6.2015 г.</a:t>
             </a:fld>
             <a:endParaRPr lang="bg-BG"/>
           </a:p>
@@ -1811,7 +1811,7 @@
           <a:p>
             <a:fld id="{3EA744D9-3FBE-48D8-BF2A-85DF203E4D20}" type="datetimeFigureOut">
               <a:rPr lang="bg-BG" smtClean="0"/>
-              <a:t>23.6.2015 г.</a:t>
+              <a:t>25.6.2015 г.</a:t>
             </a:fld>
             <a:endParaRPr lang="bg-BG"/>
           </a:p>
@@ -2233,7 +2233,7 @@
           <a:p>
             <a:fld id="{3EA744D9-3FBE-48D8-BF2A-85DF203E4D20}" type="datetimeFigureOut">
               <a:rPr lang="bg-BG" smtClean="0"/>
-              <a:t>23.6.2015 г.</a:t>
+              <a:t>25.6.2015 г.</a:t>
             </a:fld>
             <a:endParaRPr lang="bg-BG"/>
           </a:p>
@@ -2351,7 +2351,7 @@
           <a:p>
             <a:fld id="{3EA744D9-3FBE-48D8-BF2A-85DF203E4D20}" type="datetimeFigureOut">
               <a:rPr lang="bg-BG" smtClean="0"/>
-              <a:t>23.6.2015 г.</a:t>
+              <a:t>25.6.2015 г.</a:t>
             </a:fld>
             <a:endParaRPr lang="bg-BG"/>
           </a:p>
@@ -2446,7 +2446,7 @@
           <a:p>
             <a:fld id="{3EA744D9-3FBE-48D8-BF2A-85DF203E4D20}" type="datetimeFigureOut">
               <a:rPr lang="bg-BG" smtClean="0"/>
-              <a:t>23.6.2015 г.</a:t>
+              <a:t>25.6.2015 г.</a:t>
             </a:fld>
             <a:endParaRPr lang="bg-BG"/>
           </a:p>
@@ -2723,7 +2723,7 @@
           <a:p>
             <a:fld id="{3EA744D9-3FBE-48D8-BF2A-85DF203E4D20}" type="datetimeFigureOut">
               <a:rPr lang="bg-BG" smtClean="0"/>
-              <a:t>23.6.2015 г.</a:t>
+              <a:t>25.6.2015 г.</a:t>
             </a:fld>
             <a:endParaRPr lang="bg-BG"/>
           </a:p>
@@ -2976,7 +2976,7 @@
           <a:p>
             <a:fld id="{3EA744D9-3FBE-48D8-BF2A-85DF203E4D20}" type="datetimeFigureOut">
               <a:rPr lang="bg-BG" smtClean="0"/>
-              <a:t>23.6.2015 г.</a:t>
+              <a:t>25.6.2015 г.</a:t>
             </a:fld>
             <a:endParaRPr lang="bg-BG"/>
           </a:p>
@@ -3198,7 +3198,7 @@
           <a:p>
             <a:fld id="{3EA744D9-3FBE-48D8-BF2A-85DF203E4D20}" type="datetimeFigureOut">
               <a:rPr lang="bg-BG" smtClean="0"/>
-              <a:t>23.6.2015 г.</a:t>
+              <a:t>25.6.2015 г.</a:t>
             </a:fld>
             <a:endParaRPr lang="bg-BG"/>
           </a:p>
@@ -3596,6 +3596,14 @@
               </a:rPr>
               <a:t>Масиви</a:t>
             </a:r>
+            <a:r>
+              <a:rPr lang="en-US" dirty="0" smtClean="0">
+                <a:solidFill>
+                  <a:schemeClr val="accent6"/>
+                </a:solidFill>
+              </a:rPr>
+              <a:t> #1</a:t>
+            </a:r>
             <a:endParaRPr lang="bg-BG" dirty="0">
               <a:solidFill>
                 <a:schemeClr val="accent6"/>
@@ -5827,17 +5835,27 @@
               <a:t> </a:t>
             </a:r>
             <a:r>
-              <a:rPr lang="ru-RU" dirty="0" err="1">
-                <a:solidFill>
-                  <a:schemeClr val="bg1">
-                    <a:lumMod val="95000"/>
-                  </a:schemeClr>
-                </a:solidFill>
-              </a:rPr>
-              <a:t>length</a:t>
-            </a:r>
-            <a:r>
-              <a:rPr lang="ru-RU" dirty="0">
+              <a:rPr lang="en-US" dirty="0" err="1">
+                <a:solidFill>
+                  <a:schemeClr val="bg1">
+                    <a:lumMod val="95000"/>
+                  </a:schemeClr>
+                </a:solidFill>
+              </a:rPr>
+              <a:t>L</a:t>
+            </a:r>
+            <a:r>
+              <a:rPr lang="ru-RU" dirty="0" err="1" smtClean="0">
+                <a:solidFill>
+                  <a:schemeClr val="bg1">
+                    <a:lumMod val="95000"/>
+                  </a:schemeClr>
+                </a:solidFill>
+              </a:rPr>
+              <a:t>ength</a:t>
+            </a:r>
+            <a:r>
+              <a:rPr lang="ru-RU" dirty="0" smtClean="0">
                 <a:solidFill>
                   <a:schemeClr val="bg1">
                     <a:lumMod val="95000"/>
@@ -8167,16 +8185,6 @@
               <a:buNone/>
             </a:pPr>
             <a:r>
-              <a:rPr lang="en-US" dirty="0" err="1">
-                <a:solidFill>
-                  <a:schemeClr val="bg1">
-                    <a:lumMod val="95000"/>
-                  </a:schemeClr>
-                </a:solidFill>
-              </a:rPr>
-              <a:t>ourArray</a:t>
-            </a:r>
-            <a:r>
               <a:rPr lang="en-US" dirty="0" err="1" smtClean="0">
                 <a:solidFill>
                   <a:schemeClr val="bg1">
@@ -8184,7 +8192,7 @@
                   </a:schemeClr>
                 </a:solidFill>
               </a:rPr>
-              <a:t>.length</a:t>
+              <a:t>ourArray.Length</a:t>
             </a:r>
             <a:r>
               <a:rPr lang="en-US" dirty="0" smtClean="0">
@@ -8194,7 +8202,17 @@
                   </a:schemeClr>
                 </a:solidFill>
               </a:rPr>
-              <a:t> – </a:t>
+              <a:t> </a:t>
+            </a:r>
+            <a:r>
+              <a:rPr lang="en-US" dirty="0" smtClean="0">
+                <a:solidFill>
+                  <a:schemeClr val="bg1">
+                    <a:lumMod val="95000"/>
+                  </a:schemeClr>
+                </a:solidFill>
+              </a:rPr>
+              <a:t>– </a:t>
             </a:r>
             <a:r>
               <a:rPr lang="bg-BG" dirty="0" smtClean="0">

</xml_diff>